<commit_message>
corrigindo imagens diagrama de solucao
</commit_message>
<xml_diff>
--- a/Documentação/Diagrama-Solucao.pptx
+++ b/Documentação/Diagrama-Solucao.pptx
@@ -243,7 +243,7 @@
           <a:p>
             <a:fld id="{9AB3A824-1A51-4B26-AD58-A6D8E14F6C04}" type="datetimeFigureOut">
               <a:rPr lang="en-US" smtClean="0"/>
-              <a:t>10/18/2019</a:t>
+              <a:t>11/1/2019</a:t>
             </a:fld>
             <a:endParaRPr lang="en-US" dirty="0"/>
           </a:p>
@@ -290,7 +290,7 @@
           <a:p>
             <a:fld id="{6D22F896-40B5-4ADD-8801-0D06FADFA095}" type="slidenum">
               <a:rPr lang="en-US" smtClean="0"/>
-              <a:t>‹#›</a:t>
+              <a:t>‹nº›</a:t>
             </a:fld>
             <a:endParaRPr lang="en-US" dirty="0"/>
           </a:p>
@@ -418,7 +418,7 @@
           <a:p>
             <a:fld id="{D857E33E-8B18-4087-B112-809917729534}" type="datetimeFigureOut">
               <a:rPr lang="en-US" smtClean="0"/>
-              <a:t>10/18/2019</a:t>
+              <a:t>11/1/2019</a:t>
             </a:fld>
             <a:endParaRPr lang="en-US" dirty="0"/>
           </a:p>
@@ -465,7 +465,7 @@
           <a:p>
             <a:fld id="{6D22F896-40B5-4ADD-8801-0D06FADFA095}" type="slidenum">
               <a:rPr lang="en-US" smtClean="0"/>
-              <a:t>‹#›</a:t>
+              <a:t>‹nº›</a:t>
             </a:fld>
             <a:endParaRPr lang="en-US" dirty="0"/>
           </a:p>
@@ -603,7 +603,7 @@
           <a:p>
             <a:fld id="{D3FFE419-2371-464F-8239-3959401C3561}" type="datetimeFigureOut">
               <a:rPr lang="en-US" smtClean="0"/>
-              <a:t>10/18/2019</a:t>
+              <a:t>11/1/2019</a:t>
             </a:fld>
             <a:endParaRPr lang="en-US" dirty="0"/>
           </a:p>
@@ -650,7 +650,7 @@
           <a:p>
             <a:fld id="{6D22F896-40B5-4ADD-8801-0D06FADFA095}" type="slidenum">
               <a:rPr lang="en-US" smtClean="0"/>
-              <a:t>‹#›</a:t>
+              <a:t>‹nº›</a:t>
             </a:fld>
             <a:endParaRPr lang="en-US" dirty="0"/>
           </a:p>
@@ -778,7 +778,7 @@
           <a:p>
             <a:fld id="{97D162C4-EDD9-4389-A98B-B87ECEA2A816}" type="datetimeFigureOut">
               <a:rPr lang="en-US" smtClean="0"/>
-              <a:t>10/18/2019</a:t>
+              <a:t>11/1/2019</a:t>
             </a:fld>
             <a:endParaRPr lang="en-US" dirty="0"/>
           </a:p>
@@ -825,7 +825,7 @@
           <a:p>
             <a:fld id="{6D22F896-40B5-4ADD-8801-0D06FADFA095}" type="slidenum">
               <a:rPr lang="en-US" smtClean="0"/>
-              <a:t>‹#›</a:t>
+              <a:t>‹nº›</a:t>
             </a:fld>
             <a:endParaRPr lang="en-US" dirty="0"/>
           </a:p>
@@ -1029,7 +1029,7 @@
           <a:p>
             <a:fld id="{3E5059C3-6A89-4494-99FF-5A4D6FFD50EB}" type="datetimeFigureOut">
               <a:rPr lang="en-US" smtClean="0"/>
-              <a:t>10/18/2019</a:t>
+              <a:t>11/1/2019</a:t>
             </a:fld>
             <a:endParaRPr lang="en-US" dirty="0"/>
           </a:p>
@@ -1076,7 +1076,7 @@
           <a:p>
             <a:fld id="{6D22F896-40B5-4ADD-8801-0D06FADFA095}" type="slidenum">
               <a:rPr lang="en-US" smtClean="0"/>
-              <a:t>‹#›</a:t>
+              <a:t>‹nº›</a:t>
             </a:fld>
             <a:endParaRPr lang="en-US" dirty="0"/>
           </a:p>
@@ -1266,7 +1266,7 @@
           <a:p>
             <a:fld id="{CA954B2F-12DE-47F5-8894-472B206D2E1E}" type="datetimeFigureOut">
               <a:rPr lang="en-US" smtClean="0"/>
-              <a:t>10/18/2019</a:t>
+              <a:t>11/1/2019</a:t>
             </a:fld>
             <a:endParaRPr lang="en-US" dirty="0"/>
           </a:p>
@@ -1313,7 +1313,7 @@
           <a:p>
             <a:fld id="{6D22F896-40B5-4ADD-8801-0D06FADFA095}" type="slidenum">
               <a:rPr lang="en-US" smtClean="0"/>
-              <a:t>‹#›</a:t>
+              <a:t>‹nº›</a:t>
             </a:fld>
             <a:endParaRPr lang="en-US" dirty="0"/>
           </a:p>
@@ -1638,7 +1638,7 @@
           <a:p>
             <a:fld id="{3F30E46F-7819-4ACF-B48B-48222C2ACC88}" type="datetimeFigureOut">
               <a:rPr lang="en-US" smtClean="0"/>
-              <a:t>10/18/2019</a:t>
+              <a:t>11/1/2019</a:t>
             </a:fld>
             <a:endParaRPr lang="en-US" dirty="0"/>
           </a:p>
@@ -1685,7 +1685,7 @@
           <a:p>
             <a:fld id="{6D22F896-40B5-4ADD-8801-0D06FADFA095}" type="slidenum">
               <a:rPr lang="en-US" smtClean="0"/>
-              <a:t>‹#›</a:t>
+              <a:t>‹nº›</a:t>
             </a:fld>
             <a:endParaRPr lang="en-US" dirty="0"/>
           </a:p>
@@ -1761,7 +1761,7 @@
           <a:p>
             <a:fld id="{1FAF3416-4057-4DAA-829D-4CA07428D088}" type="datetimeFigureOut">
               <a:rPr lang="en-US" smtClean="0"/>
-              <a:t>10/18/2019</a:t>
+              <a:t>11/1/2019</a:t>
             </a:fld>
             <a:endParaRPr lang="en-US" dirty="0"/>
           </a:p>
@@ -1808,7 +1808,7 @@
           <a:p>
             <a:fld id="{6D22F896-40B5-4ADD-8801-0D06FADFA095}" type="slidenum">
               <a:rPr lang="en-US" smtClean="0"/>
-              <a:t>‹#›</a:t>
+              <a:t>‹nº›</a:t>
             </a:fld>
             <a:endParaRPr lang="en-US" dirty="0"/>
           </a:p>
@@ -1861,7 +1861,7 @@
           <a:p>
             <a:fld id="{921D9284-D300-4297-87F7-E791DCC15DB1}" type="datetimeFigureOut">
               <a:rPr lang="en-US" smtClean="0"/>
-              <a:t>10/18/2019</a:t>
+              <a:t>11/1/2019</a:t>
             </a:fld>
             <a:endParaRPr lang="en-US" dirty="0"/>
           </a:p>
@@ -1908,7 +1908,7 @@
           <a:p>
             <a:fld id="{6D22F896-40B5-4ADD-8801-0D06FADFA095}" type="slidenum">
               <a:rPr lang="en-US" smtClean="0"/>
-              <a:t>‹#›</a:t>
+              <a:t>‹nº›</a:t>
             </a:fld>
             <a:endParaRPr lang="en-US" dirty="0"/>
           </a:p>
@@ -2143,7 +2143,7 @@
           <a:p>
             <a:fld id="{37D525BB-DA17-4BA0-B3C8-3AC3ABC827E6}" type="datetimeFigureOut">
               <a:rPr lang="en-US" smtClean="0"/>
-              <a:t>10/18/2019</a:t>
+              <a:t>11/1/2019</a:t>
             </a:fld>
             <a:endParaRPr lang="en-US" dirty="0"/>
           </a:p>
@@ -2190,7 +2190,7 @@
           <a:p>
             <a:fld id="{6D22F896-40B5-4ADD-8801-0D06FADFA095}" type="slidenum">
               <a:rPr lang="en-US" smtClean="0"/>
-              <a:t>‹#›</a:t>
+              <a:t>‹nº›</a:t>
             </a:fld>
             <a:endParaRPr lang="en-US" dirty="0"/>
           </a:p>
@@ -2405,7 +2405,7 @@
           <a:p>
             <a:fld id="{B16C4C9A-3960-41CF-A4E9-2A8FB932454B}" type="datetimeFigureOut">
               <a:rPr lang="en-US" smtClean="0"/>
-              <a:t>10/18/2019</a:t>
+              <a:t>11/1/2019</a:t>
             </a:fld>
             <a:endParaRPr lang="en-US" dirty="0"/>
           </a:p>
@@ -2452,7 +2452,7 @@
           <a:p>
             <a:fld id="{6D22F896-40B5-4ADD-8801-0D06FADFA095}" type="slidenum">
               <a:rPr lang="en-US" smtClean="0"/>
-              <a:t>‹#›</a:t>
+              <a:t>‹nº›</a:t>
             </a:fld>
             <a:endParaRPr lang="en-US" dirty="0"/>
           </a:p>
@@ -2623,7 +2623,7 @@
           <a:p>
             <a:fld id="{3CBC1C18-307B-4F68-A007-B5B542270E8D}" type="datetimeFigureOut">
               <a:rPr lang="en-US" smtClean="0"/>
-              <a:t>10/18/2019</a:t>
+              <a:t>11/1/2019</a:t>
             </a:fld>
             <a:endParaRPr lang="en-US" dirty="0"/>
           </a:p>
@@ -2707,7 +2707,7 @@
             <a:fld id="{6D22F896-40B5-4ADD-8801-0D06FADFA095}" type="slidenum">
               <a:rPr lang="en-US" smtClean="0"/>
               <a:pPr/>
-              <a:t>‹#›</a:t>
+              <a:t>‹nº›</a:t>
             </a:fld>
             <a:endParaRPr lang="en-US" dirty="0"/>
           </a:p>
@@ -3051,8 +3051,8 @@
         </p:blipFill>
         <p:spPr>
           <a:xfrm>
-            <a:off x="4684485" y="1297604"/>
-            <a:ext cx="1901091" cy="1664686"/>
+            <a:off x="4630553" y="-567192"/>
+            <a:ext cx="4160870" cy="3643456"/>
           </a:xfrm>
           <a:prstGeom prst="rect">
             <a:avLst/>
@@ -3067,8 +3067,8 @@
         </p:nvSpPr>
         <p:spPr>
           <a:xfrm>
-            <a:off x="6688289" y="546927"/>
-            <a:ext cx="1500442" cy="1402903"/>
+            <a:off x="6810321" y="980223"/>
+            <a:ext cx="1160534" cy="1292990"/>
           </a:xfrm>
           <a:prstGeom prst="roundRect">
             <a:avLst>
@@ -3139,8 +3139,8 @@
         </p:blipFill>
         <p:spPr>
           <a:xfrm>
-            <a:off x="4604788" y="890435"/>
-            <a:ext cx="1876500" cy="560201"/>
+            <a:off x="5198947" y="1065549"/>
+            <a:ext cx="1422558" cy="424684"/>
           </a:xfrm>
           <a:prstGeom prst="rect">
             <a:avLst/>
@@ -3163,8 +3163,8 @@
         </p:blipFill>
         <p:spPr>
           <a:xfrm>
-            <a:off x="6909994" y="620151"/>
-            <a:ext cx="1111813" cy="825143"/>
+            <a:off x="6921174" y="1080041"/>
+            <a:ext cx="938828" cy="696760"/>
           </a:xfrm>
           <a:prstGeom prst="rect">
             <a:avLst/>
@@ -3187,8 +3187,8 @@
         </p:blipFill>
         <p:spPr>
           <a:xfrm>
-            <a:off x="7063039" y="1445294"/>
-            <a:ext cx="972647" cy="385473"/>
+            <a:off x="7008244" y="1741976"/>
+            <a:ext cx="821315" cy="325498"/>
           </a:xfrm>
           <a:prstGeom prst="rect">
             <a:avLst/>
@@ -3307,48 +3307,18 @@
           <p:nvPr/>
         </p:nvCxnSpPr>
         <p:spPr>
-          <a:xfrm rot="16200000" flipH="1">
-            <a:off x="7727573" y="2140349"/>
-            <a:ext cx="1009423" cy="926355"/>
+          <a:xfrm>
+            <a:off x="7829559" y="2794286"/>
+            <a:ext cx="865903" cy="313952"/>
           </a:xfrm>
           <a:prstGeom prst="bentConnector3">
             <a:avLst>
-              <a:gd name="adj1" fmla="val 50000"/>
+              <a:gd name="adj1" fmla="val -1292"/>
             </a:avLst>
           </a:prstGeom>
           <a:ln>
             <a:tailEnd type="triangle"/>
           </a:ln>
-        </p:spPr>
-        <p:style>
-          <a:lnRef idx="1">
-            <a:schemeClr val="accent1"/>
-          </a:lnRef>
-          <a:fillRef idx="0">
-            <a:schemeClr val="accent1"/>
-          </a:fillRef>
-          <a:effectRef idx="0">
-            <a:schemeClr val="accent1"/>
-          </a:effectRef>
-          <a:fontRef idx="minor">
-            <a:schemeClr val="tx1"/>
-          </a:fontRef>
-        </p:style>
-      </p:cxnSp>
-      <p:cxnSp>
-        <p:nvCxnSpPr>
-          <p:cNvPr id="109" name="Straight Connector 108"/>
-          <p:cNvCxnSpPr/>
-          <p:nvPr/>
-        </p:nvCxnSpPr>
-        <p:spPr>
-          <a:xfrm>
-            <a:off x="2886591" y="750984"/>
-            <a:ext cx="3698985" cy="0"/>
-          </a:xfrm>
-          <a:prstGeom prst="line">
-            <a:avLst/>
-          </a:prstGeom>
         </p:spPr>
         <p:style>
           <a:lnRef idx="1">
@@ -3379,41 +3349,6 @@
           <a:prstGeom prst="bentConnector3">
             <a:avLst>
               <a:gd name="adj1" fmla="val 341"/>
-            </a:avLst>
-          </a:prstGeom>
-          <a:ln>
-            <a:tailEnd type="triangle"/>
-          </a:ln>
-        </p:spPr>
-        <p:style>
-          <a:lnRef idx="1">
-            <a:schemeClr val="accent1"/>
-          </a:lnRef>
-          <a:fillRef idx="0">
-            <a:schemeClr val="accent1"/>
-          </a:fillRef>
-          <a:effectRef idx="0">
-            <a:schemeClr val="accent1"/>
-          </a:effectRef>
-          <a:fontRef idx="minor">
-            <a:schemeClr val="tx1"/>
-          </a:fontRef>
-        </p:style>
-      </p:cxnSp>
-      <p:cxnSp>
-        <p:nvCxnSpPr>
-          <p:cNvPr id="114" name="Elbow Connector 113"/>
-          <p:cNvCxnSpPr/>
-          <p:nvPr/>
-        </p:nvCxnSpPr>
-        <p:spPr>
-          <a:xfrm flipV="1">
-            <a:off x="6688289" y="2129947"/>
-            <a:ext cx="496282" cy="352634"/>
-          </a:xfrm>
-          <a:prstGeom prst="bentConnector3">
-            <a:avLst>
-              <a:gd name="adj1" fmla="val 105275"/>
             </a:avLst>
           </a:prstGeom>
           <a:ln>
@@ -3527,8 +3462,8 @@
         </p:nvSpPr>
         <p:spPr>
           <a:xfrm>
-            <a:off x="4749795" y="2887055"/>
-            <a:ext cx="1861442" cy="646331"/>
+            <a:off x="6136032" y="2831458"/>
+            <a:ext cx="810044" cy="646331"/>
           </a:xfrm>
           <a:prstGeom prst="rect">
             <a:avLst/>
@@ -3542,9 +3477,10 @@
           <a:lstStyle/>
           <a:p>
             <a:r>
-              <a:rPr lang="pt-BR" dirty="0" smtClean="0"/>
-              <a:t>Banco Relacional</a:t>
-            </a:r>
+              <a:rPr lang="pt-BR" dirty="0" err="1" smtClean="0"/>
+              <a:t>Cloud</a:t>
+            </a:r>
+            <a:endParaRPr lang="pt-BR" dirty="0" smtClean="0"/>
           </a:p>
           <a:p>
             <a:endParaRPr lang="en-US" dirty="0"/>
@@ -3737,7 +3673,7 @@
         </p:blipFill>
         <p:spPr>
           <a:xfrm>
-            <a:off x="5190113" y="1864798"/>
+            <a:off x="5489392" y="1403287"/>
             <a:ext cx="869164" cy="794967"/>
           </a:xfrm>
           <a:prstGeom prst="rect">
@@ -3777,11 +3713,13 @@
         </p:nvCxnSpPr>
         <p:spPr>
           <a:xfrm rot="10800000">
-            <a:off x="3491848" y="5713941"/>
-            <a:ext cx="1376215" cy="12700"/>
+            <a:off x="3491848" y="5695407"/>
+            <a:ext cx="1376216" cy="31235"/>
           </a:xfrm>
           <a:prstGeom prst="bentConnector3">
-            <a:avLst/>
+            <a:avLst>
+              <a:gd name="adj1" fmla="val 101256"/>
+            </a:avLst>
           </a:prstGeom>
           <a:ln>
             <a:tailEnd type="triangle"/>
@@ -3897,6 +3835,41 @@
           </a:xfrm>
           <a:prstGeom prst="straightConnector1">
             <a:avLst/>
+          </a:prstGeom>
+          <a:ln>
+            <a:tailEnd type="triangle"/>
+          </a:ln>
+        </p:spPr>
+        <p:style>
+          <a:lnRef idx="1">
+            <a:schemeClr val="accent1"/>
+          </a:lnRef>
+          <a:fillRef idx="0">
+            <a:schemeClr val="accent1"/>
+          </a:fillRef>
+          <a:effectRef idx="0">
+            <a:schemeClr val="accent1"/>
+          </a:effectRef>
+          <a:fontRef idx="minor">
+            <a:schemeClr val="tx1"/>
+          </a:fontRef>
+        </p:style>
+      </p:cxnSp>
+      <p:cxnSp>
+        <p:nvCxnSpPr>
+          <p:cNvPr id="44" name="Elbow Connector 97"/>
+          <p:cNvCxnSpPr/>
+          <p:nvPr/>
+        </p:nvCxnSpPr>
+        <p:spPr>
+          <a:xfrm>
+            <a:off x="2829601" y="980223"/>
+            <a:ext cx="1766586" cy="297668"/>
+          </a:xfrm>
+          <a:prstGeom prst="bentConnector3">
+            <a:avLst>
+              <a:gd name="adj1" fmla="val 50000"/>
+            </a:avLst>
           </a:prstGeom>
           <a:ln>
             <a:tailEnd type="triangle"/>

</xml_diff>